<commit_message>
use observer instead of monitor
</commit_message>
<xml_diff>
--- a/docs/figs/model-tuner.pptx
+++ b/docs/figs/model-tuner.pptx
@@ -197,7 +197,7 @@
           <a:p>
             <a:fld id="{69EB2757-6213-4E46-9233-0539DAC9E625}" type="datetimeFigureOut">
               <a:rPr lang="en-US" smtClean="0"/>
-              <a:t>2/19/25</a:t>
+              <a:t>2/24/25</a:t>
             </a:fld>
             <a:endParaRPr lang="en-US"/>
           </a:p>
@@ -1096,7 +1096,7 @@
           <a:p>
             <a:fld id="{12D09799-0506-DB4C-BDE2-B0EFF26CB894}" type="datetimeFigureOut">
               <a:rPr lang="en-US" smtClean="0"/>
-              <a:t>2/19/25</a:t>
+              <a:t>2/24/25</a:t>
             </a:fld>
             <a:endParaRPr lang="en-US"/>
           </a:p>
@@ -1294,7 +1294,7 @@
           <a:p>
             <a:fld id="{12D09799-0506-DB4C-BDE2-B0EFF26CB894}" type="datetimeFigureOut">
               <a:rPr lang="en-US" smtClean="0"/>
-              <a:t>2/19/25</a:t>
+              <a:t>2/24/25</a:t>
             </a:fld>
             <a:endParaRPr lang="en-US"/>
           </a:p>
@@ -1502,7 +1502,7 @@
           <a:p>
             <a:fld id="{12D09799-0506-DB4C-BDE2-B0EFF26CB894}" type="datetimeFigureOut">
               <a:rPr lang="en-US" smtClean="0"/>
-              <a:t>2/19/25</a:t>
+              <a:t>2/24/25</a:t>
             </a:fld>
             <a:endParaRPr lang="en-US"/>
           </a:p>
@@ -1700,7 +1700,7 @@
           <a:p>
             <a:fld id="{12D09799-0506-DB4C-BDE2-B0EFF26CB894}" type="datetimeFigureOut">
               <a:rPr lang="en-US" smtClean="0"/>
-              <a:t>2/19/25</a:t>
+              <a:t>2/24/25</a:t>
             </a:fld>
             <a:endParaRPr lang="en-US"/>
           </a:p>
@@ -1975,7 +1975,7 @@
           <a:p>
             <a:fld id="{12D09799-0506-DB4C-BDE2-B0EFF26CB894}" type="datetimeFigureOut">
               <a:rPr lang="en-US" smtClean="0"/>
-              <a:t>2/19/25</a:t>
+              <a:t>2/24/25</a:t>
             </a:fld>
             <a:endParaRPr lang="en-US"/>
           </a:p>
@@ -2240,7 +2240,7 @@
           <a:p>
             <a:fld id="{12D09799-0506-DB4C-BDE2-B0EFF26CB894}" type="datetimeFigureOut">
               <a:rPr lang="en-US" smtClean="0"/>
-              <a:t>2/19/25</a:t>
+              <a:t>2/24/25</a:t>
             </a:fld>
             <a:endParaRPr lang="en-US"/>
           </a:p>
@@ -2652,7 +2652,7 @@
           <a:p>
             <a:fld id="{12D09799-0506-DB4C-BDE2-B0EFF26CB894}" type="datetimeFigureOut">
               <a:rPr lang="en-US" smtClean="0"/>
-              <a:t>2/19/25</a:t>
+              <a:t>2/24/25</a:t>
             </a:fld>
             <a:endParaRPr lang="en-US"/>
           </a:p>
@@ -2793,7 +2793,7 @@
           <a:p>
             <a:fld id="{12D09799-0506-DB4C-BDE2-B0EFF26CB894}" type="datetimeFigureOut">
               <a:rPr lang="en-US" smtClean="0"/>
-              <a:t>2/19/25</a:t>
+              <a:t>2/24/25</a:t>
             </a:fld>
             <a:endParaRPr lang="en-US"/>
           </a:p>
@@ -2906,7 +2906,7 @@
           <a:p>
             <a:fld id="{12D09799-0506-DB4C-BDE2-B0EFF26CB894}" type="datetimeFigureOut">
               <a:rPr lang="en-US" smtClean="0"/>
-              <a:t>2/19/25</a:t>
+              <a:t>2/24/25</a:t>
             </a:fld>
             <a:endParaRPr lang="en-US"/>
           </a:p>
@@ -3217,7 +3217,7 @@
           <a:p>
             <a:fld id="{12D09799-0506-DB4C-BDE2-B0EFF26CB894}" type="datetimeFigureOut">
               <a:rPr lang="en-US" smtClean="0"/>
-              <a:t>2/19/25</a:t>
+              <a:t>2/24/25</a:t>
             </a:fld>
             <a:endParaRPr lang="en-US"/>
           </a:p>
@@ -3505,7 +3505,7 @@
           <a:p>
             <a:fld id="{12D09799-0506-DB4C-BDE2-B0EFF26CB894}" type="datetimeFigureOut">
               <a:rPr lang="en-US" smtClean="0"/>
-              <a:t>2/19/25</a:t>
+              <a:t>2/24/25</a:t>
             </a:fld>
             <a:endParaRPr lang="en-US"/>
           </a:p>
@@ -3746,7 +3746,7 @@
           <a:p>
             <a:fld id="{12D09799-0506-DB4C-BDE2-B0EFF26CB894}" type="datetimeFigureOut">
               <a:rPr lang="en-US" smtClean="0"/>
-              <a:t>2/19/25</a:t>
+              <a:t>2/24/25</a:t>
             </a:fld>
             <a:endParaRPr lang="en-US"/>
           </a:p>
@@ -4616,7 +4616,7 @@
         <p:spPr>
           <a:xfrm>
             <a:off x="8655627" y="5001350"/>
-            <a:ext cx="1033970" cy="369332"/>
+            <a:ext cx="1120670" cy="369332"/>
           </a:xfrm>
           <a:prstGeom prst="rect">
             <a:avLst/>
@@ -4631,7 +4631,7 @@
           <a:p>
             <a:r>
               <a:rPr lang="en-US" dirty="0"/>
-              <a:t>monitor</a:t>
+              <a:t>observer</a:t>
             </a:r>
           </a:p>
         </p:txBody>

</xml_diff>